<commit_message>
Tweaks to Oct 7
</commit_message>
<xml_diff>
--- a/Slides/100719.pptx
+++ b/Slides/100719.pptx
@@ -737,10 +737,10 @@
           </a:ln>
           <a:extLst>
             <a:ext uri="{FAA26D3D-D897-4be2-8F04-BA451C77F1D7}">
-              <ma14:placeholderFlag xmlns:ma14="http://schemas.microsoft.com/office/mac/drawingml/2011/main" xmlns="" val="1"/>
+              <ma14:placeholderFlag xmlns="" xmlns:ma14="http://schemas.microsoft.com/office/mac/drawingml/2011/main" val="1"/>
             </a:ext>
             <a:ext uri="{909E8E84-426E-40dd-AFC4-6F175D3DCCD1}">
-              <a14:hiddenFill xmlns:a14="http://schemas.microsoft.com/office/drawing/2010/main" xmlns="">
+              <a14:hiddenFill xmlns="" xmlns:a14="http://schemas.microsoft.com/office/drawing/2010/main">
                 <a:solidFill>
                   <a:srgbClr val="FFFFFF"/>
                 </a:solidFill>
@@ -915,14 +915,14 @@
           <a:ln/>
           <a:extLst>
             <a:ext uri="{909E8E84-426E-40dd-AFC4-6F175D3DCCD1}">
-              <a14:hiddenFill xmlns:a14="http://schemas.microsoft.com/office/drawing/2010/main" xmlns="">
+              <a14:hiddenFill xmlns="" xmlns:a14="http://schemas.microsoft.com/office/drawing/2010/main">
                 <a:solidFill>
                   <a:srgbClr val="FFFFFF"/>
                 </a:solidFill>
               </a14:hiddenFill>
             </a:ext>
             <a:ext uri="{91240B29-F687-4f45-9708-019B960494DF}">
-              <a14:hiddenLine xmlns:a14="http://schemas.microsoft.com/office/drawing/2010/main" xmlns="" w="9525">
+              <a14:hiddenLine xmlns="" xmlns:a14="http://schemas.microsoft.com/office/drawing/2010/main" w="9525">
                 <a:solidFill>
                   <a:srgbClr val="000000"/>
                 </a:solidFill>
@@ -1090,17 +1090,17 @@
           <a:ln/>
           <a:extLst>
             <a:ext uri="{FAA26D3D-D897-4be2-8F04-BA451C77F1D7}">
-              <ma14:placeholderFlag xmlns:ma14="http://schemas.microsoft.com/office/mac/drawingml/2011/main" xmlns="" val="1"/>
+              <ma14:placeholderFlag xmlns="" xmlns:ma14="http://schemas.microsoft.com/office/mac/drawingml/2011/main" val="1"/>
             </a:ext>
             <a:ext uri="{909E8E84-426E-40dd-AFC4-6F175D3DCCD1}">
-              <a14:hiddenFill xmlns:a14="http://schemas.microsoft.com/office/drawing/2010/main" xmlns="">
+              <a14:hiddenFill xmlns="" xmlns:a14="http://schemas.microsoft.com/office/drawing/2010/main">
                 <a:solidFill>
                   <a:srgbClr val="FFFFFF"/>
                 </a:solidFill>
               </a14:hiddenFill>
             </a:ext>
             <a:ext uri="{91240B29-F687-4f45-9708-019B960494DF}">
-              <a14:hiddenLine xmlns:a14="http://schemas.microsoft.com/office/drawing/2010/main" xmlns="" w="9525">
+              <a14:hiddenLine xmlns="" xmlns:a14="http://schemas.microsoft.com/office/drawing/2010/main" w="9525">
                 <a:solidFill>
                   <a:srgbClr val="000000"/>
                 </a:solidFill>
@@ -1517,14 +1517,14 @@
           <a:ln/>
           <a:extLst>
             <a:ext uri="{909E8E84-426E-40dd-AFC4-6F175D3DCCD1}">
-              <a14:hiddenFill xmlns:a14="http://schemas.microsoft.com/office/drawing/2010/main" xmlns="">
+              <a14:hiddenFill xmlns="" xmlns:a14="http://schemas.microsoft.com/office/drawing/2010/main">
                 <a:solidFill>
                   <a:srgbClr val="FFFFFF"/>
                 </a:solidFill>
               </a14:hiddenFill>
             </a:ext>
             <a:ext uri="{91240B29-F687-4f45-9708-019B960494DF}">
-              <a14:hiddenLine xmlns:a14="http://schemas.microsoft.com/office/drawing/2010/main" xmlns="" w="9525">
+              <a14:hiddenLine xmlns="" xmlns:a14="http://schemas.microsoft.com/office/drawing/2010/main" w="9525">
                 <a:solidFill>
                   <a:srgbClr val="000000"/>
                 </a:solidFill>
@@ -1702,7 +1702,7 @@
           </a:ln>
           <a:extLst>
             <a:ext uri="{FAA26D3D-D897-4be2-8F04-BA451C77F1D7}">
-              <ma14:placeholderFlag xmlns:ma14="http://schemas.microsoft.com/office/mac/drawingml/2011/main" xmlns="" val="1"/>
+              <ma14:placeholderFlag xmlns="" xmlns:ma14="http://schemas.microsoft.com/office/mac/drawingml/2011/main" val="1"/>
             </a:ext>
           </a:extLst>
         </p:spPr>
@@ -4893,17 +4893,17 @@
           </a:ln>
           <a:extLst>
             <a:ext uri="{FAA26D3D-D897-4be2-8F04-BA451C77F1D7}">
-              <ma14:placeholderFlag xmlns:ma14="http://schemas.microsoft.com/office/mac/drawingml/2011/main" xmlns="" val="1"/>
+              <ma14:placeholderFlag xmlns="" xmlns:ma14="http://schemas.microsoft.com/office/mac/drawingml/2011/main" val="1"/>
             </a:ext>
             <a:ext uri="{909E8E84-426E-40dd-AFC4-6F175D3DCCD1}">
-              <a14:hiddenFill xmlns:a14="http://schemas.microsoft.com/office/drawing/2010/main" xmlns="">
+              <a14:hiddenFill xmlns="" xmlns:a14="http://schemas.microsoft.com/office/drawing/2010/main">
                 <a:solidFill>
                   <a:srgbClr val="FFFFFF"/>
                 </a:solidFill>
               </a14:hiddenFill>
             </a:ext>
             <a:ext uri="{91240B29-F687-4f45-9708-019B960494DF}">
-              <a14:hiddenLine xmlns:a14="http://schemas.microsoft.com/office/drawing/2010/main" xmlns="" w="9525">
+              <a14:hiddenLine xmlns="" xmlns:a14="http://schemas.microsoft.com/office/drawing/2010/main" w="9525">
                 <a:solidFill>
                   <a:srgbClr val="000000"/>
                 </a:solidFill>
@@ -19381,7 +19381,7 @@
           </a:ln>
           <a:extLst>
             <a:ext uri="{909E8E84-426E-40dd-AFC4-6F175D3DCCD1}">
-              <a14:hiddenFill xmlns:a14="http://schemas.microsoft.com/office/drawing/2010/main" xmlns="">
+              <a14:hiddenFill xmlns="" xmlns:a14="http://schemas.microsoft.com/office/drawing/2010/main">
                 <a:solidFill>
                   <a:srgbClr val="FFFFFF"/>
                 </a:solidFill>
@@ -19424,7 +19424,7 @@
           </a:ln>
           <a:extLst>
             <a:ext uri="{909E8E84-426E-40dd-AFC4-6F175D3DCCD1}">
-              <a14:hiddenFill xmlns:a14="http://schemas.microsoft.com/office/drawing/2010/main" xmlns="">
+              <a14:hiddenFill xmlns="" xmlns:a14="http://schemas.microsoft.com/office/drawing/2010/main">
                 <a:noFill/>
               </a14:hiddenFill>
             </a:ext>
@@ -19460,14 +19460,14 @@
           </a:ln>
           <a:extLst>
             <a:ext uri="{909E8E84-426E-40dd-AFC4-6F175D3DCCD1}">
-              <a14:hiddenFill xmlns:a14="http://schemas.microsoft.com/office/drawing/2010/main" xmlns="">
+              <a14:hiddenFill xmlns="" xmlns:a14="http://schemas.microsoft.com/office/drawing/2010/main">
                 <a:solidFill>
                   <a:srgbClr val="FFFFFF"/>
                 </a:solidFill>
               </a14:hiddenFill>
             </a:ext>
             <a:ext uri="{91240B29-F687-4f45-9708-019B960494DF}">
-              <a14:hiddenLine xmlns:a14="http://schemas.microsoft.com/office/drawing/2010/main" xmlns="" w="9525">
+              <a14:hiddenLine xmlns="" xmlns:a14="http://schemas.microsoft.com/office/drawing/2010/main" w="9525">
                 <a:solidFill>
                   <a:srgbClr val="000000"/>
                 </a:solidFill>
@@ -19693,7 +19693,7 @@
           </a:ln>
           <a:extLst>
             <a:ext uri="{909E8E84-426E-40dd-AFC4-6F175D3DCCD1}">
-              <a14:hiddenFill xmlns:a14="http://schemas.microsoft.com/office/drawing/2010/main" xmlns="">
+              <a14:hiddenFill xmlns="" xmlns:a14="http://schemas.microsoft.com/office/drawing/2010/main">
                 <a:solidFill>
                   <a:srgbClr val="FFFFFF"/>
                 </a:solidFill>
@@ -19731,14 +19731,14 @@
           </a:ln>
           <a:extLst>
             <a:ext uri="{909E8E84-426E-40dd-AFC4-6F175D3DCCD1}">
-              <a14:hiddenFill xmlns:a14="http://schemas.microsoft.com/office/drawing/2010/main" xmlns="">
+              <a14:hiddenFill xmlns="" xmlns:a14="http://schemas.microsoft.com/office/drawing/2010/main">
                 <a:solidFill>
                   <a:srgbClr val="FFFFFF"/>
                 </a:solidFill>
               </a14:hiddenFill>
             </a:ext>
             <a:ext uri="{91240B29-F687-4f45-9708-019B960494DF}">
-              <a14:hiddenLine xmlns:a14="http://schemas.microsoft.com/office/drawing/2010/main" xmlns="" w="9525">
+              <a14:hiddenLine xmlns="" xmlns:a14="http://schemas.microsoft.com/office/drawing/2010/main" w="9525">
                 <a:solidFill>
                   <a:srgbClr val="000000"/>
                 </a:solidFill>
@@ -19894,14 +19894,14 @@
           </a:ln>
           <a:extLst>
             <a:ext uri="{909E8E84-426E-40dd-AFC4-6F175D3DCCD1}">
-              <a14:hiddenFill xmlns:a14="http://schemas.microsoft.com/office/drawing/2010/main" xmlns="">
+              <a14:hiddenFill xmlns="" xmlns:a14="http://schemas.microsoft.com/office/drawing/2010/main">
                 <a:solidFill>
                   <a:srgbClr val="FFFFFF"/>
                 </a:solidFill>
               </a14:hiddenFill>
             </a:ext>
             <a:ext uri="{91240B29-F687-4f45-9708-019B960494DF}">
-              <a14:hiddenLine xmlns:a14="http://schemas.microsoft.com/office/drawing/2010/main" xmlns="" w="9525">
+              <a14:hiddenLine xmlns="" xmlns:a14="http://schemas.microsoft.com/office/drawing/2010/main" w="9525">
                 <a:solidFill>
                   <a:srgbClr val="000000"/>
                 </a:solidFill>
@@ -20103,7 +20103,7 @@
           </a:ln>
           <a:extLst>
             <a:ext uri="{909E8E84-426E-40dd-AFC4-6F175D3DCCD1}">
-              <a14:hiddenFill xmlns:a14="http://schemas.microsoft.com/office/drawing/2010/main" xmlns="">
+              <a14:hiddenFill xmlns="" xmlns:a14="http://schemas.microsoft.com/office/drawing/2010/main">
                 <a:solidFill>
                   <a:srgbClr val="FFFFFF"/>
                 </a:solidFill>
@@ -20187,7 +20187,7 @@
           </a:ln>
           <a:extLst>
             <a:ext uri="{909E8E84-426E-40dd-AFC4-6F175D3DCCD1}">
-              <a14:hiddenFill xmlns:a14="http://schemas.microsoft.com/office/drawing/2010/main" xmlns="">
+              <a14:hiddenFill xmlns="" xmlns:a14="http://schemas.microsoft.com/office/drawing/2010/main">
                 <a:solidFill>
                   <a:srgbClr val="FFFFFF"/>
                 </a:solidFill>
@@ -20271,7 +20271,7 @@
           </a:ln>
           <a:extLst>
             <a:ext uri="{909E8E84-426E-40dd-AFC4-6F175D3DCCD1}">
-              <a14:hiddenFill xmlns:a14="http://schemas.microsoft.com/office/drawing/2010/main" xmlns="">
+              <a14:hiddenFill xmlns="" xmlns:a14="http://schemas.microsoft.com/office/drawing/2010/main">
                 <a:solidFill>
                   <a:srgbClr val="FFFFFF"/>
                 </a:solidFill>
@@ -20314,7 +20314,7 @@
           </a:ln>
           <a:extLst>
             <a:ext uri="{909E8E84-426E-40dd-AFC4-6F175D3DCCD1}">
-              <a14:hiddenFill xmlns:a14="http://schemas.microsoft.com/office/drawing/2010/main" xmlns="">
+              <a14:hiddenFill xmlns="" xmlns:a14="http://schemas.microsoft.com/office/drawing/2010/main">
                 <a:noFill/>
               </a14:hiddenFill>
             </a:ext>
@@ -20355,7 +20355,7 @@
           </a:ln>
           <a:extLst>
             <a:ext uri="{909E8E84-426E-40dd-AFC4-6F175D3DCCD1}">
-              <a14:hiddenFill xmlns:a14="http://schemas.microsoft.com/office/drawing/2010/main" xmlns="">
+              <a14:hiddenFill xmlns="" xmlns:a14="http://schemas.microsoft.com/office/drawing/2010/main">
                 <a:noFill/>
               </a14:hiddenFill>
             </a:ext>
@@ -20396,7 +20396,7 @@
           </a:ln>
           <a:extLst>
             <a:ext uri="{909E8E84-426E-40dd-AFC4-6F175D3DCCD1}">
-              <a14:hiddenFill xmlns:a14="http://schemas.microsoft.com/office/drawing/2010/main" xmlns="">
+              <a14:hiddenFill xmlns="" xmlns:a14="http://schemas.microsoft.com/office/drawing/2010/main">
                 <a:noFill/>
               </a14:hiddenFill>
             </a:ext>
@@ -20439,7 +20439,7 @@
           </a:ln>
           <a:extLst>
             <a:ext uri="{909E8E84-426E-40dd-AFC4-6F175D3DCCD1}">
-              <a14:hiddenFill xmlns:a14="http://schemas.microsoft.com/office/drawing/2010/main" xmlns="">
+              <a14:hiddenFill xmlns="" xmlns:a14="http://schemas.microsoft.com/office/drawing/2010/main">
                 <a:noFill/>
               </a14:hiddenFill>
             </a:ext>
@@ -20474,7 +20474,7 @@
           </a:ln>
           <a:extLst>
             <a:ext uri="{909E8E84-426E-40dd-AFC4-6F175D3DCCD1}">
-              <a14:hiddenFill xmlns:a14="http://schemas.microsoft.com/office/drawing/2010/main" xmlns="">
+              <a14:hiddenFill xmlns="" xmlns:a14="http://schemas.microsoft.com/office/drawing/2010/main">
                 <a:noFill/>
               </a14:hiddenFill>
             </a:ext>
@@ -20510,7 +20510,7 @@
           </a:ln>
           <a:extLst>
             <a:ext uri="{909E8E84-426E-40dd-AFC4-6F175D3DCCD1}">
-              <a14:hiddenFill xmlns:a14="http://schemas.microsoft.com/office/drawing/2010/main" xmlns="">
+              <a14:hiddenFill xmlns="" xmlns:a14="http://schemas.microsoft.com/office/drawing/2010/main">
                 <a:noFill/>
               </a14:hiddenFill>
             </a:ext>
@@ -20545,7 +20545,7 @@
           </a:ln>
           <a:extLst>
             <a:ext uri="{909E8E84-426E-40dd-AFC4-6F175D3DCCD1}">
-              <a14:hiddenFill xmlns:a14="http://schemas.microsoft.com/office/drawing/2010/main" xmlns="">
+              <a14:hiddenFill xmlns="" xmlns:a14="http://schemas.microsoft.com/office/drawing/2010/main">
                 <a:noFill/>
               </a14:hiddenFill>
             </a:ext>
@@ -20595,7 +20595,7 @@
             </a:ln>
             <a:extLst>
               <a:ext uri="{909E8E84-426E-40dd-AFC4-6F175D3DCCD1}">
-                <a14:hiddenFill xmlns:a14="http://schemas.microsoft.com/office/drawing/2010/main" xmlns="">
+                <a14:hiddenFill xmlns="" xmlns:a14="http://schemas.microsoft.com/office/drawing/2010/main">
                   <a:solidFill>
                     <a:srgbClr val="FFFFFF"/>
                   </a:solidFill>
@@ -20640,7 +20640,7 @@
             </a:ln>
             <a:extLst>
               <a:ext uri="{909E8E84-426E-40dd-AFC4-6F175D3DCCD1}">
-                <a14:hiddenFill xmlns:a14="http://schemas.microsoft.com/office/drawing/2010/main" xmlns="">
+                <a14:hiddenFill xmlns="" xmlns:a14="http://schemas.microsoft.com/office/drawing/2010/main">
                   <a:noFill/>
                 </a14:hiddenFill>
               </a:ext>
@@ -20785,7 +20785,7 @@
               </a:ln>
               <a:extLst>
                 <a:ext uri="{909E8E84-426E-40dd-AFC4-6F175D3DCCD1}">
-                  <a14:hiddenFill xmlns:a14="http://schemas.microsoft.com/office/drawing/2010/main" xmlns="">
+                  <a14:hiddenFill xmlns="" xmlns:a14="http://schemas.microsoft.com/office/drawing/2010/main">
                     <a:solidFill>
                       <a:srgbClr val="FFFFFF"/>
                     </a:solidFill>
@@ -20887,7 +20887,7 @@
               </a:ln>
               <a:extLst>
                 <a:ext uri="{909E8E84-426E-40dd-AFC4-6F175D3DCCD1}">
-                  <a14:hiddenFill xmlns:a14="http://schemas.microsoft.com/office/drawing/2010/main" xmlns="">
+                  <a14:hiddenFill xmlns="" xmlns:a14="http://schemas.microsoft.com/office/drawing/2010/main">
                     <a:solidFill>
                       <a:srgbClr val="FFFFFF"/>
                     </a:solidFill>
@@ -20989,7 +20989,7 @@
               </a:ln>
               <a:extLst>
                 <a:ext uri="{909E8E84-426E-40dd-AFC4-6F175D3DCCD1}">
-                  <a14:hiddenFill xmlns:a14="http://schemas.microsoft.com/office/drawing/2010/main" xmlns="">
+                  <a14:hiddenFill xmlns="" xmlns:a14="http://schemas.microsoft.com/office/drawing/2010/main">
                     <a:solidFill>
                       <a:srgbClr val="FFFFFF"/>
                     </a:solidFill>
@@ -21091,7 +21091,7 @@
               </a:ln>
               <a:extLst>
                 <a:ext uri="{909E8E84-426E-40dd-AFC4-6F175D3DCCD1}">
-                  <a14:hiddenFill xmlns:a14="http://schemas.microsoft.com/office/drawing/2010/main" xmlns="">
+                  <a14:hiddenFill xmlns="" xmlns:a14="http://schemas.microsoft.com/office/drawing/2010/main">
                     <a:solidFill>
                       <a:srgbClr val="FFFFFF"/>
                     </a:solidFill>
@@ -21129,14 +21129,14 @@
               </a:ln>
               <a:extLst>
                 <a:ext uri="{909E8E84-426E-40dd-AFC4-6F175D3DCCD1}">
-                  <a14:hiddenFill xmlns:a14="http://schemas.microsoft.com/office/drawing/2010/main" xmlns="">
+                  <a14:hiddenFill xmlns="" xmlns:a14="http://schemas.microsoft.com/office/drawing/2010/main">
                     <a:solidFill>
                       <a:srgbClr val="FFFFFF"/>
                     </a:solidFill>
                   </a14:hiddenFill>
                 </a:ext>
                 <a:ext uri="{91240B29-F687-4f45-9708-019B960494DF}">
-                  <a14:hiddenLine xmlns:a14="http://schemas.microsoft.com/office/drawing/2010/main" xmlns="" w="9525">
+                  <a14:hiddenLine xmlns="" xmlns:a14="http://schemas.microsoft.com/office/drawing/2010/main" w="9525">
                     <a:solidFill>
                       <a:srgbClr val="000000"/>
                     </a:solidFill>
@@ -21290,14 +21290,14 @@
               </a:ln>
               <a:extLst>
                 <a:ext uri="{909E8E84-426E-40dd-AFC4-6F175D3DCCD1}">
-                  <a14:hiddenFill xmlns:a14="http://schemas.microsoft.com/office/drawing/2010/main" xmlns="">
+                  <a14:hiddenFill xmlns="" xmlns:a14="http://schemas.microsoft.com/office/drawing/2010/main">
                     <a:solidFill>
                       <a:srgbClr val="FFFFFF"/>
                     </a:solidFill>
                   </a14:hiddenFill>
                 </a:ext>
                 <a:ext uri="{91240B29-F687-4f45-9708-019B960494DF}">
-                  <a14:hiddenLine xmlns:a14="http://schemas.microsoft.com/office/drawing/2010/main" xmlns="" w="9525">
+                  <a14:hiddenLine xmlns="" xmlns:a14="http://schemas.microsoft.com/office/drawing/2010/main" w="9525">
                     <a:solidFill>
                       <a:srgbClr val="000000"/>
                     </a:solidFill>
@@ -21459,7 +21459,7 @@
               </a:ln>
               <a:extLst>
                 <a:ext uri="{909E8E84-426E-40dd-AFC4-6F175D3DCCD1}">
-                  <a14:hiddenFill xmlns:a14="http://schemas.microsoft.com/office/drawing/2010/main" xmlns="">
+                  <a14:hiddenFill xmlns="" xmlns:a14="http://schemas.microsoft.com/office/drawing/2010/main">
                     <a:noFill/>
                   </a14:hiddenFill>
                 </a:ext>
@@ -21493,7 +21493,7 @@
               </a:ln>
               <a:extLst>
                 <a:ext uri="{909E8E84-426E-40dd-AFC4-6F175D3DCCD1}">
-                  <a14:hiddenFill xmlns:a14="http://schemas.microsoft.com/office/drawing/2010/main" xmlns="">
+                  <a14:hiddenFill xmlns="" xmlns:a14="http://schemas.microsoft.com/office/drawing/2010/main">
                     <a:noFill/>
                   </a14:hiddenFill>
                 </a:ext>
@@ -21518,7 +21518,7 @@
           <a:graphicData uri="http://schemas.openxmlformats.org/presentationml/2006/ole">
             <mc:AlternateContent xmlns:mc="http://schemas.openxmlformats.org/markup-compatibility/2006">
               <mc:Choice xmlns:v="urn:schemas-microsoft-com:vml" Requires="v">
-                <p:oleObj spid="_x0000_s1174" name="Equation" r:id="rId3" imgW="317362" imgH="228501" progId="Equation.3">
+                <p:oleObj spid="_x0000_s1176" name="Equation" r:id="rId3" imgW="317362" imgH="228501" progId="Equation.3">
                   <p:embed/>
                 </p:oleObj>
               </mc:Choice>
@@ -21561,14 +21561,14 @@
                       <a:effectLst/>
                       <a:extLst>
                         <a:ext uri="{909E8E84-426E-40dd-AFC4-6F175D3DCCD1}">
-                          <a14:hiddenFill xmlns:a14="http://schemas.microsoft.com/office/drawing/2010/main" xmlns="">
+                          <a14:hiddenFill xmlns="" xmlns:a14="http://schemas.microsoft.com/office/drawing/2010/main">
                             <a:solidFill>
                               <a:srgbClr val="FFFFFF"/>
                             </a:solidFill>
                           </a14:hiddenFill>
                         </a:ext>
                         <a:ext uri="{91240B29-F687-4f45-9708-019B960494DF}">
-                          <a14:hiddenLine xmlns:a14="http://schemas.microsoft.com/office/drawing/2010/main" xmlns="" w="9525">
+                          <a14:hiddenLine xmlns="" xmlns:a14="http://schemas.microsoft.com/office/drawing/2010/main" w="9525">
                             <a:solidFill>
                               <a:srgbClr val="000000"/>
                             </a:solidFill>
@@ -21578,7 +21578,7 @@
                           </a14:hiddenLine>
                         </a:ext>
                         <a:ext uri="{AF507438-7753-43e0-B8FC-AC1667EBCBE1}">
-                          <a14:hiddenEffects xmlns:a14="http://schemas.microsoft.com/office/drawing/2010/main" xmlns="">
+                          <a14:hiddenEffects xmlns="" xmlns:a14="http://schemas.microsoft.com/office/drawing/2010/main">
                             <a:effectLst>
                               <a:outerShdw blurRad="63500" dist="38099" dir="2700000" algn="ctr" rotWithShape="0">
                                 <a:srgbClr val="000000">
@@ -21613,7 +21613,7 @@
           <a:graphicData uri="http://schemas.openxmlformats.org/presentationml/2006/ole">
             <mc:AlternateContent xmlns:mc="http://schemas.openxmlformats.org/markup-compatibility/2006">
               <mc:Choice xmlns:v="urn:schemas-microsoft-com:vml" Requires="v">
-                <p:oleObj spid="_x0000_s1175" name="Equation" r:id="rId5" imgW="355292" imgH="393359" progId="Equation.3">
+                <p:oleObj spid="_x0000_s1177" name="Equation" r:id="rId5" imgW="355292" imgH="393359" progId="Equation.3">
                   <p:embed/>
                 </p:oleObj>
               </mc:Choice>
@@ -21656,14 +21656,14 @@
                       <a:effectLst/>
                       <a:extLst>
                         <a:ext uri="{909E8E84-426E-40dd-AFC4-6F175D3DCCD1}">
-                          <a14:hiddenFill xmlns:a14="http://schemas.microsoft.com/office/drawing/2010/main" xmlns="">
+                          <a14:hiddenFill xmlns="" xmlns:a14="http://schemas.microsoft.com/office/drawing/2010/main">
                             <a:solidFill>
                               <a:srgbClr val="FFFFFF"/>
                             </a:solidFill>
                           </a14:hiddenFill>
                         </a:ext>
                         <a:ext uri="{91240B29-F687-4f45-9708-019B960494DF}">
-                          <a14:hiddenLine xmlns:a14="http://schemas.microsoft.com/office/drawing/2010/main" xmlns="" w="9525">
+                          <a14:hiddenLine xmlns="" xmlns:a14="http://schemas.microsoft.com/office/drawing/2010/main" w="9525">
                             <a:solidFill>
                               <a:srgbClr val="000000"/>
                             </a:solidFill>
@@ -21673,7 +21673,7 @@
                           </a14:hiddenLine>
                         </a:ext>
                         <a:ext uri="{AF507438-7753-43e0-B8FC-AC1667EBCBE1}">
-                          <a14:hiddenEffects xmlns:a14="http://schemas.microsoft.com/office/drawing/2010/main" xmlns="">
+                          <a14:hiddenEffects xmlns="" xmlns:a14="http://schemas.microsoft.com/office/drawing/2010/main">
                             <a:effectLst>
                               <a:outerShdw blurRad="63500" dist="38099" dir="2700000" algn="ctr" rotWithShape="0">
                                 <a:srgbClr val="000000">
@@ -22422,7 +22422,7 @@
           <a:graphicData uri="http://schemas.openxmlformats.org/presentationml/2006/ole">
             <mc:AlternateContent xmlns:mc="http://schemas.openxmlformats.org/markup-compatibility/2006">
               <mc:Choice xmlns:v="urn:schemas-microsoft-com:vml" Requires="v">
-                <p:oleObj spid="_x0000_s2272" name="Equation" r:id="rId3" imgW="2717800" imgH="1511300" progId="Equation.3">
+                <p:oleObj spid="_x0000_s2275" name="Equation" r:id="rId3" imgW="2717800" imgH="1511300" progId="Equation.3">
                   <p:embed/>
                 </p:oleObj>
               </mc:Choice>
@@ -22656,7 +22656,7 @@
           </a:ln>
           <a:extLst>
             <a:ext uri="{909E8E84-426E-40dd-AFC4-6F175D3DCCD1}">
-              <a14:hiddenFill xmlns:a14="http://schemas.microsoft.com/office/drawing/2010/main" xmlns="">
+              <a14:hiddenFill xmlns="" xmlns:a14="http://schemas.microsoft.com/office/drawing/2010/main">
                 <a:solidFill>
                   <a:srgbClr val="FFFFFF"/>
                 </a:solidFill>
@@ -22699,7 +22699,7 @@
           </a:ln>
           <a:extLst>
             <a:ext uri="{909E8E84-426E-40dd-AFC4-6F175D3DCCD1}">
-              <a14:hiddenFill xmlns:a14="http://schemas.microsoft.com/office/drawing/2010/main" xmlns="">
+              <a14:hiddenFill xmlns="" xmlns:a14="http://schemas.microsoft.com/office/drawing/2010/main">
                 <a:noFill/>
               </a14:hiddenFill>
             </a:ext>
@@ -22735,14 +22735,14 @@
           </a:ln>
           <a:extLst>
             <a:ext uri="{909E8E84-426E-40dd-AFC4-6F175D3DCCD1}">
-              <a14:hiddenFill xmlns:a14="http://schemas.microsoft.com/office/drawing/2010/main" xmlns="">
+              <a14:hiddenFill xmlns="" xmlns:a14="http://schemas.microsoft.com/office/drawing/2010/main">
                 <a:solidFill>
                   <a:srgbClr val="FFFFFF"/>
                 </a:solidFill>
               </a14:hiddenFill>
             </a:ext>
             <a:ext uri="{91240B29-F687-4f45-9708-019B960494DF}">
-              <a14:hiddenLine xmlns:a14="http://schemas.microsoft.com/office/drawing/2010/main" xmlns="" w="9525">
+              <a14:hiddenLine xmlns="" xmlns:a14="http://schemas.microsoft.com/office/drawing/2010/main" w="9525">
                 <a:solidFill>
                   <a:srgbClr val="000000"/>
                 </a:solidFill>
@@ -22968,7 +22968,7 @@
           </a:ln>
           <a:extLst>
             <a:ext uri="{909E8E84-426E-40dd-AFC4-6F175D3DCCD1}">
-              <a14:hiddenFill xmlns:a14="http://schemas.microsoft.com/office/drawing/2010/main" xmlns="">
+              <a14:hiddenFill xmlns="" xmlns:a14="http://schemas.microsoft.com/office/drawing/2010/main">
                 <a:solidFill>
                   <a:srgbClr val="FFFFFF"/>
                 </a:solidFill>
@@ -23006,14 +23006,14 @@
           </a:ln>
           <a:extLst>
             <a:ext uri="{909E8E84-426E-40dd-AFC4-6F175D3DCCD1}">
-              <a14:hiddenFill xmlns:a14="http://schemas.microsoft.com/office/drawing/2010/main" xmlns="">
+              <a14:hiddenFill xmlns="" xmlns:a14="http://schemas.microsoft.com/office/drawing/2010/main">
                 <a:solidFill>
                   <a:srgbClr val="FFFFFF"/>
                 </a:solidFill>
               </a14:hiddenFill>
             </a:ext>
             <a:ext uri="{91240B29-F687-4f45-9708-019B960494DF}">
-              <a14:hiddenLine xmlns:a14="http://schemas.microsoft.com/office/drawing/2010/main" xmlns="" w="9525">
+              <a14:hiddenLine xmlns="" xmlns:a14="http://schemas.microsoft.com/office/drawing/2010/main" w="9525">
                 <a:solidFill>
                   <a:srgbClr val="000000"/>
                 </a:solidFill>
@@ -23169,14 +23169,14 @@
           </a:ln>
           <a:extLst>
             <a:ext uri="{909E8E84-426E-40dd-AFC4-6F175D3DCCD1}">
-              <a14:hiddenFill xmlns:a14="http://schemas.microsoft.com/office/drawing/2010/main" xmlns="">
+              <a14:hiddenFill xmlns="" xmlns:a14="http://schemas.microsoft.com/office/drawing/2010/main">
                 <a:solidFill>
                   <a:srgbClr val="FFFFFF"/>
                 </a:solidFill>
               </a14:hiddenFill>
             </a:ext>
             <a:ext uri="{91240B29-F687-4f45-9708-019B960494DF}">
-              <a14:hiddenLine xmlns:a14="http://schemas.microsoft.com/office/drawing/2010/main" xmlns="" w="9525">
+              <a14:hiddenLine xmlns="" xmlns:a14="http://schemas.microsoft.com/office/drawing/2010/main" w="9525">
                 <a:solidFill>
                   <a:srgbClr val="000000"/>
                 </a:solidFill>
@@ -23381,7 +23381,7 @@
           </a:ln>
           <a:extLst>
             <a:ext uri="{909E8E84-426E-40dd-AFC4-6F175D3DCCD1}">
-              <a14:hiddenFill xmlns:a14="http://schemas.microsoft.com/office/drawing/2010/main" xmlns="">
+              <a14:hiddenFill xmlns="" xmlns:a14="http://schemas.microsoft.com/office/drawing/2010/main">
                 <a:solidFill>
                   <a:srgbClr val="FFFFFF"/>
                 </a:solidFill>
@@ -23465,7 +23465,7 @@
           </a:ln>
           <a:extLst>
             <a:ext uri="{909E8E84-426E-40dd-AFC4-6F175D3DCCD1}">
-              <a14:hiddenFill xmlns:a14="http://schemas.microsoft.com/office/drawing/2010/main" xmlns="">
+              <a14:hiddenFill xmlns="" xmlns:a14="http://schemas.microsoft.com/office/drawing/2010/main">
                 <a:solidFill>
                   <a:srgbClr val="FFFFFF"/>
                 </a:solidFill>
@@ -23549,7 +23549,7 @@
           </a:ln>
           <a:extLst>
             <a:ext uri="{909E8E84-426E-40dd-AFC4-6F175D3DCCD1}">
-              <a14:hiddenFill xmlns:a14="http://schemas.microsoft.com/office/drawing/2010/main" xmlns="">
+              <a14:hiddenFill xmlns="" xmlns:a14="http://schemas.microsoft.com/office/drawing/2010/main">
                 <a:solidFill>
                   <a:srgbClr val="FFFFFF"/>
                 </a:solidFill>
@@ -23592,7 +23592,7 @@
           </a:ln>
           <a:extLst>
             <a:ext uri="{909E8E84-426E-40dd-AFC4-6F175D3DCCD1}">
-              <a14:hiddenFill xmlns:a14="http://schemas.microsoft.com/office/drawing/2010/main" xmlns="">
+              <a14:hiddenFill xmlns="" xmlns:a14="http://schemas.microsoft.com/office/drawing/2010/main">
                 <a:noFill/>
               </a14:hiddenFill>
             </a:ext>
@@ -23633,7 +23633,7 @@
           </a:ln>
           <a:extLst>
             <a:ext uri="{909E8E84-426E-40dd-AFC4-6F175D3DCCD1}">
-              <a14:hiddenFill xmlns:a14="http://schemas.microsoft.com/office/drawing/2010/main" xmlns="">
+              <a14:hiddenFill xmlns="" xmlns:a14="http://schemas.microsoft.com/office/drawing/2010/main">
                 <a:noFill/>
               </a14:hiddenFill>
             </a:ext>
@@ -23674,7 +23674,7 @@
           </a:ln>
           <a:extLst>
             <a:ext uri="{909E8E84-426E-40dd-AFC4-6F175D3DCCD1}">
-              <a14:hiddenFill xmlns:a14="http://schemas.microsoft.com/office/drawing/2010/main" xmlns="">
+              <a14:hiddenFill xmlns="" xmlns:a14="http://schemas.microsoft.com/office/drawing/2010/main">
                 <a:noFill/>
               </a14:hiddenFill>
             </a:ext>
@@ -23717,7 +23717,7 @@
           </a:ln>
           <a:extLst>
             <a:ext uri="{909E8E84-426E-40dd-AFC4-6F175D3DCCD1}">
-              <a14:hiddenFill xmlns:a14="http://schemas.microsoft.com/office/drawing/2010/main" xmlns="">
+              <a14:hiddenFill xmlns="" xmlns:a14="http://schemas.microsoft.com/office/drawing/2010/main">
                 <a:noFill/>
               </a14:hiddenFill>
             </a:ext>
@@ -23752,7 +23752,7 @@
           </a:ln>
           <a:extLst>
             <a:ext uri="{909E8E84-426E-40dd-AFC4-6F175D3DCCD1}">
-              <a14:hiddenFill xmlns:a14="http://schemas.microsoft.com/office/drawing/2010/main" xmlns="">
+              <a14:hiddenFill xmlns="" xmlns:a14="http://schemas.microsoft.com/office/drawing/2010/main">
                 <a:noFill/>
               </a14:hiddenFill>
             </a:ext>
@@ -23788,7 +23788,7 @@
           </a:ln>
           <a:extLst>
             <a:ext uri="{909E8E84-426E-40dd-AFC4-6F175D3DCCD1}">
-              <a14:hiddenFill xmlns:a14="http://schemas.microsoft.com/office/drawing/2010/main" xmlns="">
+              <a14:hiddenFill xmlns="" xmlns:a14="http://schemas.microsoft.com/office/drawing/2010/main">
                 <a:noFill/>
               </a14:hiddenFill>
             </a:ext>
@@ -23823,7 +23823,7 @@
           </a:ln>
           <a:extLst>
             <a:ext uri="{909E8E84-426E-40dd-AFC4-6F175D3DCCD1}">
-              <a14:hiddenFill xmlns:a14="http://schemas.microsoft.com/office/drawing/2010/main" xmlns="">
+              <a14:hiddenFill xmlns="" xmlns:a14="http://schemas.microsoft.com/office/drawing/2010/main">
                 <a:noFill/>
               </a14:hiddenFill>
             </a:ext>
@@ -23846,7 +23846,7 @@
           <a:graphicData uri="http://schemas.openxmlformats.org/presentationml/2006/ole">
             <mc:AlternateContent xmlns:mc="http://schemas.openxmlformats.org/markup-compatibility/2006">
               <mc:Choice xmlns:v="urn:schemas-microsoft-com:vml" Requires="v">
-                <p:oleObj spid="_x0000_s2273" name="Equation" r:id="rId5" imgW="317362" imgH="228501" progId="Equation.3">
+                <p:oleObj spid="_x0000_s2276" name="Equation" r:id="rId5" imgW="317362" imgH="228501" progId="Equation.3">
                   <p:embed/>
                 </p:oleObj>
               </mc:Choice>
@@ -23889,14 +23889,14 @@
                       <a:effectLst/>
                       <a:extLst>
                         <a:ext uri="{909E8E84-426E-40dd-AFC4-6F175D3DCCD1}">
-                          <a14:hiddenFill xmlns:a14="http://schemas.microsoft.com/office/drawing/2010/main" xmlns="">
+                          <a14:hiddenFill xmlns="" xmlns:a14="http://schemas.microsoft.com/office/drawing/2010/main">
                             <a:solidFill>
                               <a:srgbClr val="FFFFFF"/>
                             </a:solidFill>
                           </a14:hiddenFill>
                         </a:ext>
                         <a:ext uri="{91240B29-F687-4f45-9708-019B960494DF}">
-                          <a14:hiddenLine xmlns:a14="http://schemas.microsoft.com/office/drawing/2010/main" xmlns="" w="9525">
+                          <a14:hiddenLine xmlns="" xmlns:a14="http://schemas.microsoft.com/office/drawing/2010/main" w="9525">
                             <a:solidFill>
                               <a:srgbClr val="000000"/>
                             </a:solidFill>
@@ -23906,7 +23906,7 @@
                           </a14:hiddenLine>
                         </a:ext>
                         <a:ext uri="{AF507438-7753-43e0-B8FC-AC1667EBCBE1}">
-                          <a14:hiddenEffects xmlns:a14="http://schemas.microsoft.com/office/drawing/2010/main" xmlns="">
+                          <a14:hiddenEffects xmlns="" xmlns:a14="http://schemas.microsoft.com/office/drawing/2010/main">
                             <a:effectLst>
                               <a:outerShdw blurRad="63500" dist="38099" dir="2700000" algn="ctr" rotWithShape="0">
                                 <a:srgbClr val="000000">
@@ -23941,7 +23941,7 @@
           <a:graphicData uri="http://schemas.openxmlformats.org/presentationml/2006/ole">
             <mc:AlternateContent xmlns:mc="http://schemas.openxmlformats.org/markup-compatibility/2006">
               <mc:Choice xmlns:v="urn:schemas-microsoft-com:vml" Requires="v">
-                <p:oleObj spid="_x0000_s2274" name="Equation" r:id="rId7" imgW="355292" imgH="393359" progId="Equation.3">
+                <p:oleObj spid="_x0000_s2277" name="Equation" r:id="rId7" imgW="355292" imgH="393359" progId="Equation.3">
                   <p:embed/>
                 </p:oleObj>
               </mc:Choice>
@@ -23984,14 +23984,14 @@
                       <a:effectLst/>
                       <a:extLst>
                         <a:ext uri="{909E8E84-426E-40dd-AFC4-6F175D3DCCD1}">
-                          <a14:hiddenFill xmlns:a14="http://schemas.microsoft.com/office/drawing/2010/main" xmlns="">
+                          <a14:hiddenFill xmlns="" xmlns:a14="http://schemas.microsoft.com/office/drawing/2010/main">
                             <a:solidFill>
                               <a:srgbClr val="FFFFFF"/>
                             </a:solidFill>
                           </a14:hiddenFill>
                         </a:ext>
                         <a:ext uri="{91240B29-F687-4f45-9708-019B960494DF}">
-                          <a14:hiddenLine xmlns:a14="http://schemas.microsoft.com/office/drawing/2010/main" xmlns="" w="9525">
+                          <a14:hiddenLine xmlns="" xmlns:a14="http://schemas.microsoft.com/office/drawing/2010/main" w="9525">
                             <a:solidFill>
                               <a:srgbClr val="000000"/>
                             </a:solidFill>
@@ -24001,7 +24001,7 @@
                           </a14:hiddenLine>
                         </a:ext>
                         <a:ext uri="{AF507438-7753-43e0-B8FC-AC1667EBCBE1}">
-                          <a14:hiddenEffects xmlns:a14="http://schemas.microsoft.com/office/drawing/2010/main" xmlns="">
+                          <a14:hiddenEffects xmlns="" xmlns:a14="http://schemas.microsoft.com/office/drawing/2010/main">
                             <a:effectLst>
                               <a:outerShdw blurRad="63500" dist="38099" dir="2700000" algn="ctr" rotWithShape="0">
                                 <a:srgbClr val="000000">
@@ -24527,37 +24527,6 @@
           </a:p>
         </p:txBody>
       </p:sp>
-      <p:sp>
-        <p:nvSpPr>
-          <p:cNvPr id="6" name="Footer Placeholder 5">
-            <a:extLst>
-              <a:ext uri="{FF2B5EF4-FFF2-40B4-BE49-F238E27FC236}">
-                <a16:creationId xmlns:a16="http://schemas.microsoft.com/office/drawing/2014/main" id="{0672737A-3D02-5C41-A6DF-2397902877B3}"/>
-              </a:ext>
-            </a:extLst>
-          </p:cNvPr>
-          <p:cNvSpPr>
-            <a:spLocks noGrp="1"/>
-          </p:cNvSpPr>
-          <p:nvPr>
-            <p:ph type="ftr" sz="quarter" idx="11"/>
-          </p:nvPr>
-        </p:nvSpPr>
-        <p:spPr/>
-        <p:txBody>
-          <a:bodyPr/>
-          <a:lstStyle/>
-          <a:p>
-            <a:r>
-              <a:rPr lang="en-US"/>
-              <a:t>EECS 489 – Lecture 10</a:t>
-            </a:r>
-            <a:endParaRPr lang="en-US" sz="1050" b="0">
-              <a:latin typeface="Times New Roman" charset="0"/>
-            </a:endParaRPr>
-          </a:p>
-        </p:txBody>
-      </p:sp>
     </p:spTree>
     <p:extLst>
       <p:ext uri="{BB962C8B-B14F-4D97-AF65-F5344CB8AC3E}">
@@ -24857,7 +24826,7 @@
           <a:graphicData uri="http://schemas.openxmlformats.org/presentationml/2006/ole">
             <mc:AlternateContent xmlns:mc="http://schemas.openxmlformats.org/markup-compatibility/2006">
               <mc:Choice xmlns:v="urn:schemas-microsoft-com:vml" Requires="v">
-                <p:oleObj spid="_x0000_s3148" name="Equation" r:id="rId3" imgW="1663700" imgH="469900" progId="Equation.3">
+                <p:oleObj spid="_x0000_s3149" name="Equation" r:id="rId3" imgW="1663700" imgH="469900" progId="Equation.3">
                   <p:embed/>
                 </p:oleObj>
               </mc:Choice>
@@ -24943,12 +24912,12 @@
             <a:effectLst/>
             <a:extLst>
               <a:ext uri="{909E8E84-426E-40dd-AFC4-6F175D3DCCD1}">
-                <a14:hiddenFill xmlns:a14="http://schemas.microsoft.com/office/drawing/2010/main" xmlns="">
+                <a14:hiddenFill xmlns="" xmlns:a14="http://schemas.microsoft.com/office/drawing/2010/main">
                   <a:noFill/>
                 </a14:hiddenFill>
               </a:ext>
               <a:ext uri="{AF507438-7753-43e0-B8FC-AC1667EBCBE1}">
-                <a14:hiddenEffects xmlns:a14="http://schemas.microsoft.com/office/drawing/2010/main" xmlns="">
+                <a14:hiddenEffects xmlns="" xmlns:a14="http://schemas.microsoft.com/office/drawing/2010/main">
                   <a:effectLst>
                     <a:outerShdw blurRad="63500" dist="38099" dir="2700000" algn="ctr" rotWithShape="0">
                       <a:schemeClr val="bg2">
@@ -24991,14 +24960,14 @@
             <a:effectLst/>
             <a:extLst>
               <a:ext uri="{909E8E84-426E-40dd-AFC4-6F175D3DCCD1}">
-                <a14:hiddenFill xmlns:a14="http://schemas.microsoft.com/office/drawing/2010/main" xmlns="">
+                <a14:hiddenFill xmlns="" xmlns:a14="http://schemas.microsoft.com/office/drawing/2010/main">
                   <a:solidFill>
                     <a:schemeClr val="accent1"/>
                   </a:solidFill>
                 </a14:hiddenFill>
               </a:ext>
               <a:ext uri="{91240B29-F687-4f45-9708-019B960494DF}">
-                <a14:hiddenLine xmlns:a14="http://schemas.microsoft.com/office/drawing/2010/main" xmlns="" w="9525">
+                <a14:hiddenLine xmlns="" xmlns:a14="http://schemas.microsoft.com/office/drawing/2010/main" w="9525">
                   <a:solidFill>
                     <a:schemeClr val="tx1"/>
                   </a:solidFill>
@@ -25008,7 +24977,7 @@
                 </a14:hiddenLine>
               </a:ext>
               <a:ext uri="{AF507438-7753-43e0-B8FC-AC1667EBCBE1}">
-                <a14:hiddenEffects xmlns:a14="http://schemas.microsoft.com/office/drawing/2010/main" xmlns="">
+                <a14:hiddenEffects xmlns="" xmlns:a14="http://schemas.microsoft.com/office/drawing/2010/main">
                   <a:effectLst>
                     <a:outerShdw blurRad="63500" dist="38099" dir="2700000" algn="ctr" rotWithShape="0">
                       <a:schemeClr val="bg2">
@@ -25061,7 +25030,7 @@
             <a:effectLst/>
             <a:extLst>
               <a:ext uri="{AF507438-7753-43e0-B8FC-AC1667EBCBE1}">
-                <a14:hiddenEffects xmlns:a14="http://schemas.microsoft.com/office/drawing/2010/main" xmlns="">
+                <a14:hiddenEffects xmlns="" xmlns:a14="http://schemas.microsoft.com/office/drawing/2010/main">
                   <a:effectLst>
                     <a:outerShdw blurRad="63500" dist="38099" dir="2700000" algn="ctr" rotWithShape="0">
                       <a:schemeClr val="bg2">
@@ -25117,7 +25086,7 @@
             <a:effectLst/>
             <a:extLst>
               <a:ext uri="{AF507438-7753-43e0-B8FC-AC1667EBCBE1}">
-                <a14:hiddenEffects xmlns:a14="http://schemas.microsoft.com/office/drawing/2010/main" xmlns="">
+                <a14:hiddenEffects xmlns="" xmlns:a14="http://schemas.microsoft.com/office/drawing/2010/main">
                   <a:effectLst>
                     <a:outerShdw blurRad="63500" dist="38099" dir="2700000" algn="ctr" rotWithShape="0">
                       <a:schemeClr val="bg2">
@@ -25173,7 +25142,7 @@
             <a:effectLst/>
             <a:extLst>
               <a:ext uri="{AF507438-7753-43e0-B8FC-AC1667EBCBE1}">
-                <a14:hiddenEffects xmlns:a14="http://schemas.microsoft.com/office/drawing/2010/main" xmlns="">
+                <a14:hiddenEffects xmlns="" xmlns:a14="http://schemas.microsoft.com/office/drawing/2010/main">
                   <a:effectLst>
                     <a:outerShdw blurRad="63500" dist="38099" dir="2700000" algn="ctr" rotWithShape="0">
                       <a:schemeClr val="bg2">
@@ -25229,7 +25198,7 @@
             <a:effectLst/>
             <a:extLst>
               <a:ext uri="{AF507438-7753-43e0-B8FC-AC1667EBCBE1}">
-                <a14:hiddenEffects xmlns:a14="http://schemas.microsoft.com/office/drawing/2010/main" xmlns="">
+                <a14:hiddenEffects xmlns="" xmlns:a14="http://schemas.microsoft.com/office/drawing/2010/main">
                   <a:effectLst>
                     <a:outerShdw blurRad="63500" dist="38099" dir="2700000" algn="ctr" rotWithShape="0">
                       <a:schemeClr val="bg2">
@@ -25284,12 +25253,12 @@
             <a:effectLst/>
             <a:extLst>
               <a:ext uri="{909E8E84-426E-40dd-AFC4-6F175D3DCCD1}">
-                <a14:hiddenFill xmlns:a14="http://schemas.microsoft.com/office/drawing/2010/main" xmlns="">
+                <a14:hiddenFill xmlns="" xmlns:a14="http://schemas.microsoft.com/office/drawing/2010/main">
                   <a:noFill/>
                 </a14:hiddenFill>
               </a:ext>
               <a:ext uri="{AF507438-7753-43e0-B8FC-AC1667EBCBE1}">
-                <a14:hiddenEffects xmlns:a14="http://schemas.microsoft.com/office/drawing/2010/main" xmlns="">
+                <a14:hiddenEffects xmlns="" xmlns:a14="http://schemas.microsoft.com/office/drawing/2010/main">
                   <a:effectLst>
                     <a:outerShdw blurRad="63500" dist="38099" dir="2700000" algn="ctr" rotWithShape="0">
                       <a:schemeClr val="bg2">
@@ -25346,14 +25315,14 @@
           <a:effectLst/>
           <a:extLst>
             <a:ext uri="{909E8E84-426E-40dd-AFC4-6F175D3DCCD1}">
-              <a14:hiddenFill xmlns:a14="http://schemas.microsoft.com/office/drawing/2010/main" xmlns="">
+              <a14:hiddenFill xmlns="" xmlns:a14="http://schemas.microsoft.com/office/drawing/2010/main">
                 <a:solidFill>
                   <a:schemeClr val="accent1"/>
                 </a:solidFill>
               </a14:hiddenFill>
             </a:ext>
             <a:ext uri="{91240B29-F687-4f45-9708-019B960494DF}">
-              <a14:hiddenLine xmlns:a14="http://schemas.microsoft.com/office/drawing/2010/main" xmlns="" w="9525">
+              <a14:hiddenLine xmlns="" xmlns:a14="http://schemas.microsoft.com/office/drawing/2010/main" w="9525">
                 <a:solidFill>
                   <a:schemeClr val="tx1"/>
                 </a:solidFill>
@@ -25363,7 +25332,7 @@
               </a14:hiddenLine>
             </a:ext>
             <a:ext uri="{AF507438-7753-43e0-B8FC-AC1667EBCBE1}">
-              <a14:hiddenEffects xmlns:a14="http://schemas.microsoft.com/office/drawing/2010/main" xmlns="">
+              <a14:hiddenEffects xmlns="" xmlns:a14="http://schemas.microsoft.com/office/drawing/2010/main">
                 <a:effectLst>
                   <a:outerShdw blurRad="63500" dist="38099" dir="2700000" algn="ctr" rotWithShape="0">
                     <a:schemeClr val="bg2">
@@ -25412,14 +25381,14 @@
           <a:effectLst/>
           <a:extLst>
             <a:ext uri="{909E8E84-426E-40dd-AFC4-6F175D3DCCD1}">
-              <a14:hiddenFill xmlns:a14="http://schemas.microsoft.com/office/drawing/2010/main" xmlns="">
+              <a14:hiddenFill xmlns="" xmlns:a14="http://schemas.microsoft.com/office/drawing/2010/main">
                 <a:solidFill>
                   <a:schemeClr val="accent1"/>
                 </a:solidFill>
               </a14:hiddenFill>
             </a:ext>
             <a:ext uri="{91240B29-F687-4f45-9708-019B960494DF}">
-              <a14:hiddenLine xmlns:a14="http://schemas.microsoft.com/office/drawing/2010/main" xmlns="" w="9525">
+              <a14:hiddenLine xmlns="" xmlns:a14="http://schemas.microsoft.com/office/drawing/2010/main" w="9525">
                 <a:solidFill>
                   <a:schemeClr val="tx1"/>
                 </a:solidFill>
@@ -25429,7 +25398,7 @@
               </a14:hiddenLine>
             </a:ext>
             <a:ext uri="{AF507438-7753-43e0-B8FC-AC1667EBCBE1}">
-              <a14:hiddenEffects xmlns:a14="http://schemas.microsoft.com/office/drawing/2010/main" xmlns="">
+              <a14:hiddenEffects xmlns="" xmlns:a14="http://schemas.microsoft.com/office/drawing/2010/main">
                 <a:effectLst>
                   <a:outerShdw blurRad="63500" dist="38099" dir="2700000" algn="ctr" rotWithShape="0">
                     <a:schemeClr val="bg2">
@@ -26110,7 +26079,7 @@
           <a:graphicData uri="http://schemas.openxmlformats.org/presentationml/2006/ole">
             <mc:AlternateContent xmlns:mc="http://schemas.openxmlformats.org/markup-compatibility/2006">
               <mc:Choice xmlns:v="urn:schemas-microsoft-com:vml" Requires="v">
-                <p:oleObj spid="_x0000_s4172" name="Equation" r:id="rId3" imgW="1663700" imgH="469900" progId="Equation.3">
+                <p:oleObj spid="_x0000_s4173" name="Equation" r:id="rId3" imgW="1663700" imgH="469900" progId="Equation.3">
                   <p:embed/>
                 </p:oleObj>
               </mc:Choice>
@@ -27584,7 +27553,7 @@
           <a:graphicData uri="http://schemas.openxmlformats.org/presentationml/2006/ole">
             <mc:AlternateContent xmlns:mc="http://schemas.openxmlformats.org/markup-compatibility/2006">
               <mc:Choice xmlns:v="urn:schemas-microsoft-com:vml" Requires="v">
-                <p:oleObj spid="_x0000_s5196" name="Equation" r:id="rId3" imgW="1663700" imgH="469900" progId="Equation.3">
+                <p:oleObj spid="_x0000_s5197" name="Equation" r:id="rId3" imgW="1663700" imgH="469900" progId="Equation.3">
                   <p:embed/>
                 </p:oleObj>
               </mc:Choice>
@@ -30029,14 +29998,14 @@
           </a:ln>
           <a:extLst>
             <a:ext uri="{909E8E84-426E-40dd-AFC4-6F175D3DCCD1}">
-              <a14:hiddenFill xmlns:a14="http://schemas.microsoft.com/office/drawing/2010/main" xmlns="">
+              <a14:hiddenFill xmlns="" xmlns:a14="http://schemas.microsoft.com/office/drawing/2010/main">
                 <a:solidFill>
                   <a:srgbClr val="FFFFFF"/>
                 </a:solidFill>
               </a14:hiddenFill>
             </a:ext>
             <a:ext uri="{91240B29-F687-4f45-9708-019B960494DF}">
-              <a14:hiddenLine xmlns:a14="http://schemas.microsoft.com/office/drawing/2010/main" xmlns="" w="9525">
+              <a14:hiddenLine xmlns="" xmlns:a14="http://schemas.microsoft.com/office/drawing/2010/main" w="9525">
                 <a:solidFill>
                   <a:srgbClr val="000000"/>
                 </a:solidFill>
@@ -30101,7 +30070,7 @@
             <a:effectLst/>
             <a:extLst>
               <a:ext uri="{AF507438-7753-43e0-B8FC-AC1667EBCBE1}">
-                <a14:hiddenEffects xmlns:a14="http://schemas.microsoft.com/office/drawing/2010/main" xmlns="">
+                <a14:hiddenEffects xmlns="" xmlns:a14="http://schemas.microsoft.com/office/drawing/2010/main">
                   <a:effectLst>
                     <a:outerShdw blurRad="63500" dist="38099" dir="2700000" algn="ctr" rotWithShape="0">
                       <a:schemeClr val="bg2">
@@ -30160,7 +30129,7 @@
             <a:effectLst/>
             <a:extLst>
               <a:ext uri="{AF507438-7753-43e0-B8FC-AC1667EBCBE1}">
-                <a14:hiddenEffects xmlns:a14="http://schemas.microsoft.com/office/drawing/2010/main" xmlns="">
+                <a14:hiddenEffects xmlns="" xmlns:a14="http://schemas.microsoft.com/office/drawing/2010/main">
                   <a:effectLst>
                     <a:outerShdw blurRad="63500" dist="38099" dir="2700000" algn="ctr" rotWithShape="0">
                       <a:schemeClr val="bg2">
@@ -30215,7 +30184,7 @@
             <a:effectLst/>
             <a:extLst>
               <a:ext uri="{AF507438-7753-43e0-B8FC-AC1667EBCBE1}">
-                <a14:hiddenEffects xmlns:a14="http://schemas.microsoft.com/office/drawing/2010/main" xmlns="">
+                <a14:hiddenEffects xmlns="" xmlns:a14="http://schemas.microsoft.com/office/drawing/2010/main">
                   <a:effectLst>
                     <a:outerShdw blurRad="63500" dist="38099" dir="2700000" algn="ctr" rotWithShape="0">
                       <a:schemeClr val="bg2">
@@ -30272,12 +30241,12 @@
             <a:effectLst/>
             <a:extLst>
               <a:ext uri="{909E8E84-426E-40dd-AFC4-6F175D3DCCD1}">
-                <a14:hiddenFill xmlns:a14="http://schemas.microsoft.com/office/drawing/2010/main" xmlns="">
+                <a14:hiddenFill xmlns="" xmlns:a14="http://schemas.microsoft.com/office/drawing/2010/main">
                   <a:noFill/>
                 </a14:hiddenFill>
               </a:ext>
               <a:ext uri="{AF507438-7753-43e0-B8FC-AC1667EBCBE1}">
-                <a14:hiddenEffects xmlns:a14="http://schemas.microsoft.com/office/drawing/2010/main" xmlns="">
+                <a14:hiddenEffects xmlns="" xmlns:a14="http://schemas.microsoft.com/office/drawing/2010/main">
                   <a:effectLst>
                     <a:outerShdw blurRad="63500" dist="38099" dir="2700000" algn="ctr" rotWithShape="0">
                       <a:schemeClr val="bg2">
@@ -30330,12 +30299,12 @@
             <a:effectLst/>
             <a:extLst>
               <a:ext uri="{909E8E84-426E-40dd-AFC4-6F175D3DCCD1}">
-                <a14:hiddenFill xmlns:a14="http://schemas.microsoft.com/office/drawing/2010/main" xmlns="">
+                <a14:hiddenFill xmlns="" xmlns:a14="http://schemas.microsoft.com/office/drawing/2010/main">
                   <a:noFill/>
                 </a14:hiddenFill>
               </a:ext>
               <a:ext uri="{AF507438-7753-43e0-B8FC-AC1667EBCBE1}">
-                <a14:hiddenEffects xmlns:a14="http://schemas.microsoft.com/office/drawing/2010/main" xmlns="">
+                <a14:hiddenEffects xmlns="" xmlns:a14="http://schemas.microsoft.com/office/drawing/2010/main">
                   <a:effectLst>
                     <a:outerShdw blurRad="63500" dist="38099" dir="2700000" algn="ctr" rotWithShape="0">
                       <a:schemeClr val="bg2">
@@ -30383,14 +30352,14 @@
             <a:effectLst/>
             <a:extLst>
               <a:ext uri="{909E8E84-426E-40dd-AFC4-6F175D3DCCD1}">
-                <a14:hiddenFill xmlns:a14="http://schemas.microsoft.com/office/drawing/2010/main" xmlns="">
+                <a14:hiddenFill xmlns="" xmlns:a14="http://schemas.microsoft.com/office/drawing/2010/main">
                   <a:solidFill>
                     <a:schemeClr val="accent1"/>
                   </a:solidFill>
                 </a14:hiddenFill>
               </a:ext>
               <a:ext uri="{91240B29-F687-4f45-9708-019B960494DF}">
-                <a14:hiddenLine xmlns:a14="http://schemas.microsoft.com/office/drawing/2010/main" xmlns="" w="9525">
+                <a14:hiddenLine xmlns="" xmlns:a14="http://schemas.microsoft.com/office/drawing/2010/main" w="9525">
                   <a:solidFill>
                     <a:schemeClr val="tx1"/>
                   </a:solidFill>
@@ -30400,7 +30369,7 @@
                 </a14:hiddenLine>
               </a:ext>
               <a:ext uri="{AF507438-7753-43e0-B8FC-AC1667EBCBE1}">
-                <a14:hiddenEffects xmlns:a14="http://schemas.microsoft.com/office/drawing/2010/main" xmlns="">
+                <a14:hiddenEffects xmlns="" xmlns:a14="http://schemas.microsoft.com/office/drawing/2010/main">
                   <a:effectLst>
                     <a:outerShdw blurRad="63500" dist="38099" dir="2700000" algn="ctr" rotWithShape="0">
                       <a:schemeClr val="bg2">
@@ -30555,14 +30524,14 @@
             <a:effectLst/>
             <a:extLst>
               <a:ext uri="{909E8E84-426E-40dd-AFC4-6F175D3DCCD1}">
-                <a14:hiddenFill xmlns:a14="http://schemas.microsoft.com/office/drawing/2010/main" xmlns="">
+                <a14:hiddenFill xmlns="" xmlns:a14="http://schemas.microsoft.com/office/drawing/2010/main">
                   <a:solidFill>
                     <a:schemeClr val="accent1"/>
                   </a:solidFill>
                 </a14:hiddenFill>
               </a:ext>
               <a:ext uri="{91240B29-F687-4f45-9708-019B960494DF}">
-                <a14:hiddenLine xmlns:a14="http://schemas.microsoft.com/office/drawing/2010/main" xmlns="" w="9525">
+                <a14:hiddenLine xmlns="" xmlns:a14="http://schemas.microsoft.com/office/drawing/2010/main" w="9525">
                   <a:solidFill>
                     <a:schemeClr val="tx1"/>
                   </a:solidFill>
@@ -30572,7 +30541,7 @@
                 </a14:hiddenLine>
               </a:ext>
               <a:ext uri="{AF507438-7753-43e0-B8FC-AC1667EBCBE1}">
-                <a14:hiddenEffects xmlns:a14="http://schemas.microsoft.com/office/drawing/2010/main" xmlns="">
+                <a14:hiddenEffects xmlns="" xmlns:a14="http://schemas.microsoft.com/office/drawing/2010/main">
                   <a:effectLst>
                     <a:outerShdw blurRad="63500" dist="38099" dir="2700000" algn="ctr" rotWithShape="0">
                       <a:schemeClr val="bg2">
@@ -30740,7 +30709,7 @@
             <a:effectLst/>
             <a:extLst>
               <a:ext uri="{AF507438-7753-43e0-B8FC-AC1667EBCBE1}">
-                <a14:hiddenEffects xmlns:a14="http://schemas.microsoft.com/office/drawing/2010/main" xmlns="">
+                <a14:hiddenEffects xmlns="" xmlns:a14="http://schemas.microsoft.com/office/drawing/2010/main">
                   <a:effectLst>
                     <a:outerShdw blurRad="63500" dist="38099" dir="2700000" algn="ctr" rotWithShape="0">
                       <a:schemeClr val="bg2">
@@ -30799,7 +30768,7 @@
             <a:effectLst/>
             <a:extLst>
               <a:ext uri="{AF507438-7753-43e0-B8FC-AC1667EBCBE1}">
-                <a14:hiddenEffects xmlns:a14="http://schemas.microsoft.com/office/drawing/2010/main" xmlns="">
+                <a14:hiddenEffects xmlns="" xmlns:a14="http://schemas.microsoft.com/office/drawing/2010/main">
                   <a:effectLst>
                     <a:outerShdw blurRad="63500" dist="38099" dir="2700000" algn="ctr" rotWithShape="0">
                       <a:schemeClr val="bg2">
@@ -30856,12 +30825,12 @@
             <a:effectLst/>
             <a:extLst>
               <a:ext uri="{909E8E84-426E-40dd-AFC4-6F175D3DCCD1}">
-                <a14:hiddenFill xmlns:a14="http://schemas.microsoft.com/office/drawing/2010/main" xmlns="">
+                <a14:hiddenFill xmlns="" xmlns:a14="http://schemas.microsoft.com/office/drawing/2010/main">
                   <a:noFill/>
                 </a14:hiddenFill>
               </a:ext>
               <a:ext uri="{AF507438-7753-43e0-B8FC-AC1667EBCBE1}">
-                <a14:hiddenEffects xmlns:a14="http://schemas.microsoft.com/office/drawing/2010/main" xmlns="">
+                <a14:hiddenEffects xmlns="" xmlns:a14="http://schemas.microsoft.com/office/drawing/2010/main">
                   <a:effectLst>
                     <a:outerShdw blurRad="63500" dist="38099" dir="2700000" algn="ctr" rotWithShape="0">
                       <a:schemeClr val="bg2">
@@ -30914,12 +30883,12 @@
             <a:effectLst/>
             <a:extLst>
               <a:ext uri="{909E8E84-426E-40dd-AFC4-6F175D3DCCD1}">
-                <a14:hiddenFill xmlns:a14="http://schemas.microsoft.com/office/drawing/2010/main" xmlns="">
+                <a14:hiddenFill xmlns="" xmlns:a14="http://schemas.microsoft.com/office/drawing/2010/main">
                   <a:noFill/>
                 </a14:hiddenFill>
               </a:ext>
               <a:ext uri="{AF507438-7753-43e0-B8FC-AC1667EBCBE1}">
-                <a14:hiddenEffects xmlns:a14="http://schemas.microsoft.com/office/drawing/2010/main" xmlns="">
+                <a14:hiddenEffects xmlns="" xmlns:a14="http://schemas.microsoft.com/office/drawing/2010/main">
                   <a:effectLst>
                     <a:outerShdw blurRad="63500" dist="38099" dir="2700000" algn="ctr" rotWithShape="0">
                       <a:schemeClr val="bg2">
@@ -30967,14 +30936,14 @@
             <a:effectLst/>
             <a:extLst>
               <a:ext uri="{909E8E84-426E-40dd-AFC4-6F175D3DCCD1}">
-                <a14:hiddenFill xmlns:a14="http://schemas.microsoft.com/office/drawing/2010/main" xmlns="">
+                <a14:hiddenFill xmlns="" xmlns:a14="http://schemas.microsoft.com/office/drawing/2010/main">
                   <a:solidFill>
                     <a:schemeClr val="accent1"/>
                   </a:solidFill>
                 </a14:hiddenFill>
               </a:ext>
               <a:ext uri="{91240B29-F687-4f45-9708-019B960494DF}">
-                <a14:hiddenLine xmlns:a14="http://schemas.microsoft.com/office/drawing/2010/main" xmlns="" w="9525">
+                <a14:hiddenLine xmlns="" xmlns:a14="http://schemas.microsoft.com/office/drawing/2010/main" w="9525">
                   <a:solidFill>
                     <a:schemeClr val="tx1"/>
                   </a:solidFill>
@@ -30984,7 +30953,7 @@
                 </a14:hiddenLine>
               </a:ext>
               <a:ext uri="{AF507438-7753-43e0-B8FC-AC1667EBCBE1}">
-                <a14:hiddenEffects xmlns:a14="http://schemas.microsoft.com/office/drawing/2010/main" xmlns="">
+                <a14:hiddenEffects xmlns="" xmlns:a14="http://schemas.microsoft.com/office/drawing/2010/main">
                   <a:effectLst>
                     <a:outerShdw blurRad="63500" dist="38099" dir="2700000" algn="ctr" rotWithShape="0">
                       <a:schemeClr val="bg2">
@@ -31139,14 +31108,14 @@
             <a:effectLst/>
             <a:extLst>
               <a:ext uri="{909E8E84-426E-40dd-AFC4-6F175D3DCCD1}">
-                <a14:hiddenFill xmlns:a14="http://schemas.microsoft.com/office/drawing/2010/main" xmlns="">
+                <a14:hiddenFill xmlns="" xmlns:a14="http://schemas.microsoft.com/office/drawing/2010/main">
                   <a:solidFill>
                     <a:schemeClr val="accent1"/>
                   </a:solidFill>
                 </a14:hiddenFill>
               </a:ext>
               <a:ext uri="{91240B29-F687-4f45-9708-019B960494DF}">
-                <a14:hiddenLine xmlns:a14="http://schemas.microsoft.com/office/drawing/2010/main" xmlns="" w="9525">
+                <a14:hiddenLine xmlns="" xmlns:a14="http://schemas.microsoft.com/office/drawing/2010/main" w="9525">
                   <a:solidFill>
                     <a:schemeClr val="tx1"/>
                   </a:solidFill>
@@ -31156,7 +31125,7 @@
                 </a14:hiddenLine>
               </a:ext>
               <a:ext uri="{AF507438-7753-43e0-B8FC-AC1667EBCBE1}">
-                <a14:hiddenEffects xmlns:a14="http://schemas.microsoft.com/office/drawing/2010/main" xmlns="">
+                <a14:hiddenEffects xmlns="" xmlns:a14="http://schemas.microsoft.com/office/drawing/2010/main">
                   <a:effectLst>
                     <a:outerShdw blurRad="63500" dist="38099" dir="2700000" algn="ctr" rotWithShape="0">
                       <a:schemeClr val="bg2">
@@ -36303,7 +36272,7 @@
           </a:ln>
           <a:extLst>
             <a:ext uri="{909E8E84-426E-40dd-AFC4-6F175D3DCCD1}">
-              <a14:hiddenFill xmlns:a14="http://schemas.microsoft.com/office/drawing/2010/main" xmlns="">
+              <a14:hiddenFill xmlns="" xmlns:a14="http://schemas.microsoft.com/office/drawing/2010/main">
                 <a:solidFill>
                   <a:srgbClr val="FFFFFF"/>
                 </a:solidFill>
@@ -36413,7 +36382,7 @@
           </a:ln>
           <a:extLst>
             <a:ext uri="{909E8E84-426E-40dd-AFC4-6F175D3DCCD1}">
-              <a14:hiddenFill xmlns:a14="http://schemas.microsoft.com/office/drawing/2010/main" xmlns="">
+              <a14:hiddenFill xmlns="" xmlns:a14="http://schemas.microsoft.com/office/drawing/2010/main">
                 <a:solidFill>
                   <a:srgbClr val="FFFFFF"/>
                 </a:solidFill>
@@ -36451,14 +36420,14 @@
           </a:ln>
           <a:extLst>
             <a:ext uri="{909E8E84-426E-40dd-AFC4-6F175D3DCCD1}">
-              <a14:hiddenFill xmlns:a14="http://schemas.microsoft.com/office/drawing/2010/main" xmlns="">
+              <a14:hiddenFill xmlns="" xmlns:a14="http://schemas.microsoft.com/office/drawing/2010/main">
                 <a:solidFill>
                   <a:srgbClr val="FFFFFF"/>
                 </a:solidFill>
               </a14:hiddenFill>
             </a:ext>
             <a:ext uri="{91240B29-F687-4f45-9708-019B960494DF}">
-              <a14:hiddenLine xmlns:a14="http://schemas.microsoft.com/office/drawing/2010/main" xmlns="" w="9525">
+              <a14:hiddenLine xmlns="" xmlns:a14="http://schemas.microsoft.com/office/drawing/2010/main" w="9525">
                 <a:solidFill>
                   <a:srgbClr val="000000"/>
                 </a:solidFill>
@@ -36614,14 +36583,14 @@
           </a:ln>
           <a:extLst>
             <a:ext uri="{909E8E84-426E-40dd-AFC4-6F175D3DCCD1}">
-              <a14:hiddenFill xmlns:a14="http://schemas.microsoft.com/office/drawing/2010/main" xmlns="">
+              <a14:hiddenFill xmlns="" xmlns:a14="http://schemas.microsoft.com/office/drawing/2010/main">
                 <a:solidFill>
                   <a:srgbClr val="FFFFFF"/>
                 </a:solidFill>
               </a14:hiddenFill>
             </a:ext>
             <a:ext uri="{91240B29-F687-4f45-9708-019B960494DF}">
-              <a14:hiddenLine xmlns:a14="http://schemas.microsoft.com/office/drawing/2010/main" xmlns="" w="9525">
+              <a14:hiddenLine xmlns="" xmlns:a14="http://schemas.microsoft.com/office/drawing/2010/main" w="9525">
                 <a:solidFill>
                   <a:srgbClr val="000000"/>
                 </a:solidFill>
@@ -36777,14 +36746,14 @@
           </a:ln>
           <a:extLst>
             <a:ext uri="{909E8E84-426E-40dd-AFC4-6F175D3DCCD1}">
-              <a14:hiddenFill xmlns:a14="http://schemas.microsoft.com/office/drawing/2010/main" xmlns="">
+              <a14:hiddenFill xmlns="" xmlns:a14="http://schemas.microsoft.com/office/drawing/2010/main">
                 <a:solidFill>
                   <a:srgbClr val="FFFFFF"/>
                 </a:solidFill>
               </a14:hiddenFill>
             </a:ext>
             <a:ext uri="{91240B29-F687-4f45-9708-019B960494DF}">
-              <a14:hiddenLine xmlns:a14="http://schemas.microsoft.com/office/drawing/2010/main" xmlns="" w="9525">
+              <a14:hiddenLine xmlns="" xmlns:a14="http://schemas.microsoft.com/office/drawing/2010/main" w="9525">
                 <a:solidFill>
                   <a:srgbClr val="000000"/>
                 </a:solidFill>
@@ -37013,7 +36982,7 @@
           </a:ln>
           <a:extLst>
             <a:ext uri="{909E8E84-426E-40dd-AFC4-6F175D3DCCD1}">
-              <a14:hiddenFill xmlns:a14="http://schemas.microsoft.com/office/drawing/2010/main" xmlns="">
+              <a14:hiddenFill xmlns="" xmlns:a14="http://schemas.microsoft.com/office/drawing/2010/main">
                 <a:solidFill>
                   <a:srgbClr val="FFFFFF"/>
                 </a:solidFill>
@@ -37056,7 +37025,7 @@
           </a:ln>
           <a:extLst>
             <a:ext uri="{909E8E84-426E-40dd-AFC4-6F175D3DCCD1}">
-              <a14:hiddenFill xmlns:a14="http://schemas.microsoft.com/office/drawing/2010/main" xmlns="">
+              <a14:hiddenFill xmlns="" xmlns:a14="http://schemas.microsoft.com/office/drawing/2010/main">
                 <a:noFill/>
               </a14:hiddenFill>
             </a:ext>
@@ -37180,7 +37149,7 @@
             </a:ln>
             <a:extLst>
               <a:ext uri="{909E8E84-426E-40dd-AFC4-6F175D3DCCD1}">
-                <a14:hiddenFill xmlns:a14="http://schemas.microsoft.com/office/drawing/2010/main" xmlns="">
+                <a14:hiddenFill xmlns="" xmlns:a14="http://schemas.microsoft.com/office/drawing/2010/main">
                   <a:solidFill>
                     <a:srgbClr val="FFFFFF"/>
                   </a:solidFill>
@@ -37359,7 +37328,7 @@
             </a:ln>
             <a:extLst>
               <a:ext uri="{909E8E84-426E-40dd-AFC4-6F175D3DCCD1}">
-                <a14:hiddenFill xmlns:a14="http://schemas.microsoft.com/office/drawing/2010/main" xmlns="">
+                <a14:hiddenFill xmlns="" xmlns:a14="http://schemas.microsoft.com/office/drawing/2010/main">
                   <a:solidFill>
                     <a:srgbClr val="FFFFFF"/>
                   </a:solidFill>
@@ -37402,7 +37371,7 @@
             </a:ln>
             <a:extLst>
               <a:ext uri="{909E8E84-426E-40dd-AFC4-6F175D3DCCD1}">
-                <a14:hiddenFill xmlns:a14="http://schemas.microsoft.com/office/drawing/2010/main" xmlns="">
+                <a14:hiddenFill xmlns="" xmlns:a14="http://schemas.microsoft.com/office/drawing/2010/main">
                   <a:noFill/>
                 </a14:hiddenFill>
               </a:ext>
@@ -37443,7 +37412,7 @@
             </a:ln>
             <a:extLst>
               <a:ext uri="{909E8E84-426E-40dd-AFC4-6F175D3DCCD1}">
-                <a14:hiddenFill xmlns:a14="http://schemas.microsoft.com/office/drawing/2010/main" xmlns="">
+                <a14:hiddenFill xmlns="" xmlns:a14="http://schemas.microsoft.com/office/drawing/2010/main">
                   <a:noFill/>
                 </a14:hiddenFill>
               </a:ext>
@@ -37501,7 +37470,7 @@
             </a:ln>
             <a:extLst>
               <a:ext uri="{909E8E84-426E-40dd-AFC4-6F175D3DCCD1}">
-                <a14:hiddenFill xmlns:a14="http://schemas.microsoft.com/office/drawing/2010/main" xmlns="">
+                <a14:hiddenFill xmlns="" xmlns:a14="http://schemas.microsoft.com/office/drawing/2010/main">
                   <a:noFill/>
                 </a14:hiddenFill>
               </a:ext>
@@ -37537,14 +37506,14 @@
             </a:ln>
             <a:extLst>
               <a:ext uri="{909E8E84-426E-40dd-AFC4-6F175D3DCCD1}">
-                <a14:hiddenFill xmlns:a14="http://schemas.microsoft.com/office/drawing/2010/main" xmlns="">
+                <a14:hiddenFill xmlns="" xmlns:a14="http://schemas.microsoft.com/office/drawing/2010/main">
                   <a:solidFill>
                     <a:srgbClr val="FFFFFF"/>
                   </a:solidFill>
                 </a14:hiddenFill>
               </a:ext>
               <a:ext uri="{91240B29-F687-4f45-9708-019B960494DF}">
-                <a14:hiddenLine xmlns:a14="http://schemas.microsoft.com/office/drawing/2010/main" xmlns="" w="38100">
+                <a14:hiddenLine xmlns="" xmlns:a14="http://schemas.microsoft.com/office/drawing/2010/main" w="38100">
                   <a:solidFill>
                     <a:srgbClr val="000000"/>
                   </a:solidFill>
@@ -37705,7 +37674,7 @@
             </a:ln>
             <a:extLst>
               <a:ext uri="{909E8E84-426E-40dd-AFC4-6F175D3DCCD1}">
-                <a14:hiddenFill xmlns:a14="http://schemas.microsoft.com/office/drawing/2010/main" xmlns="">
+                <a14:hiddenFill xmlns="" xmlns:a14="http://schemas.microsoft.com/office/drawing/2010/main">
                   <a:noFill/>
                 </a14:hiddenFill>
               </a:ext>
@@ -37758,14 +37727,14 @@
             </a:ln>
             <a:extLst>
               <a:ext uri="{909E8E84-426E-40dd-AFC4-6F175D3DCCD1}">
-                <a14:hiddenFill xmlns:a14="http://schemas.microsoft.com/office/drawing/2010/main" xmlns="">
+                <a14:hiddenFill xmlns="" xmlns:a14="http://schemas.microsoft.com/office/drawing/2010/main">
                   <a:solidFill>
                     <a:srgbClr val="FFFFFF"/>
                   </a:solidFill>
                 </a14:hiddenFill>
               </a:ext>
               <a:ext uri="{91240B29-F687-4f45-9708-019B960494DF}">
-                <a14:hiddenLine xmlns:a14="http://schemas.microsoft.com/office/drawing/2010/main" xmlns="" w="38100">
+                <a14:hiddenLine xmlns="" xmlns:a14="http://schemas.microsoft.com/office/drawing/2010/main" w="38100">
                   <a:solidFill>
                     <a:srgbClr val="000000"/>
                   </a:solidFill>
@@ -37928,7 +37897,7 @@
             </a:ln>
             <a:extLst>
               <a:ext uri="{909E8E84-426E-40dd-AFC4-6F175D3DCCD1}">
-                <a14:hiddenFill xmlns:a14="http://schemas.microsoft.com/office/drawing/2010/main" xmlns="">
+                <a14:hiddenFill xmlns="" xmlns:a14="http://schemas.microsoft.com/office/drawing/2010/main">
                   <a:noFill/>
                 </a14:hiddenFill>
               </a:ext>
@@ -37964,7 +37933,7 @@
             </a:ln>
             <a:extLst>
               <a:ext uri="{909E8E84-426E-40dd-AFC4-6F175D3DCCD1}">
-                <a14:hiddenFill xmlns:a14="http://schemas.microsoft.com/office/drawing/2010/main" xmlns="">
+                <a14:hiddenFill xmlns="" xmlns:a14="http://schemas.microsoft.com/office/drawing/2010/main">
                   <a:noFill/>
                 </a14:hiddenFill>
               </a:ext>
@@ -38015,7 +37984,7 @@
             </a:ln>
             <a:extLst>
               <a:ext uri="{909E8E84-426E-40dd-AFC4-6F175D3DCCD1}">
-                <a14:hiddenFill xmlns:a14="http://schemas.microsoft.com/office/drawing/2010/main" xmlns="">
+                <a14:hiddenFill xmlns="" xmlns:a14="http://schemas.microsoft.com/office/drawing/2010/main">
                   <a:noFill/>
                 </a14:hiddenFill>
               </a:ext>
@@ -38051,14 +38020,14 @@
             </a:ln>
             <a:extLst>
               <a:ext uri="{909E8E84-426E-40dd-AFC4-6F175D3DCCD1}">
-                <a14:hiddenFill xmlns:a14="http://schemas.microsoft.com/office/drawing/2010/main" xmlns="">
+                <a14:hiddenFill xmlns="" xmlns:a14="http://schemas.microsoft.com/office/drawing/2010/main">
                   <a:solidFill>
                     <a:srgbClr val="FFFFFF"/>
                   </a:solidFill>
                 </a14:hiddenFill>
               </a:ext>
               <a:ext uri="{91240B29-F687-4f45-9708-019B960494DF}">
-                <a14:hiddenLine xmlns:a14="http://schemas.microsoft.com/office/drawing/2010/main" xmlns="" w="38100">
+                <a14:hiddenLine xmlns="" xmlns:a14="http://schemas.microsoft.com/office/drawing/2010/main" w="38100">
                   <a:solidFill>
                     <a:srgbClr val="000000"/>
                   </a:solidFill>

</xml_diff>